<commit_message>
Updated comparisons with art nouveau 2
</commit_message>
<xml_diff>
--- a/ART370 History of Graphic Design/Comparisons.pptx
+++ b/ART370 History of Graphic Design/Comparisons.pptx
@@ -6,6 +6,7 @@
   </p:sldMasterIdLst>
   <p:sldIdLst>
     <p:sldId id="258" r:id="rId2"/>
+    <p:sldId id="259" r:id="rId3"/>
   </p:sldIdLst>
   <p:sldSz cx="9144000" cy="6858000" type="screen4x3"/>
   <p:notesSz cx="6858000" cy="9144000"/>
@@ -288,7 +289,7 @@
           <a:p>
             <a:fld id="{8EE9B700-9B3E-4941-A27C-46EF4EE4729A}" type="datetimeFigureOut">
               <a:rPr lang="en-US" smtClean="0"/>
-              <a:t>22/9/15</a:t>
+              <a:t>25/9/15</a:t>
             </a:fld>
             <a:endParaRPr lang="en-US"/>
           </a:p>
@@ -458,7 +459,7 @@
           <a:p>
             <a:fld id="{8EE9B700-9B3E-4941-A27C-46EF4EE4729A}" type="datetimeFigureOut">
               <a:rPr lang="en-US" smtClean="0"/>
-              <a:t>22/9/15</a:t>
+              <a:t>25/9/15</a:t>
             </a:fld>
             <a:endParaRPr lang="en-US"/>
           </a:p>
@@ -638,7 +639,7 @@
           <a:p>
             <a:fld id="{8EE9B700-9B3E-4941-A27C-46EF4EE4729A}" type="datetimeFigureOut">
               <a:rPr lang="en-US" smtClean="0"/>
-              <a:t>22/9/15</a:t>
+              <a:t>25/9/15</a:t>
             </a:fld>
             <a:endParaRPr lang="en-US"/>
           </a:p>
@@ -808,7 +809,7 @@
           <a:p>
             <a:fld id="{8EE9B700-9B3E-4941-A27C-46EF4EE4729A}" type="datetimeFigureOut">
               <a:rPr lang="en-US" smtClean="0"/>
-              <a:t>22/9/15</a:t>
+              <a:t>25/9/15</a:t>
             </a:fld>
             <a:endParaRPr lang="en-US"/>
           </a:p>
@@ -1054,7 +1055,7 @@
           <a:p>
             <a:fld id="{8EE9B700-9B3E-4941-A27C-46EF4EE4729A}" type="datetimeFigureOut">
               <a:rPr lang="en-US" smtClean="0"/>
-              <a:t>22/9/15</a:t>
+              <a:t>25/9/15</a:t>
             </a:fld>
             <a:endParaRPr lang="en-US"/>
           </a:p>
@@ -1342,7 +1343,7 @@
           <a:p>
             <a:fld id="{8EE9B700-9B3E-4941-A27C-46EF4EE4729A}" type="datetimeFigureOut">
               <a:rPr lang="en-US" smtClean="0"/>
-              <a:t>22/9/15</a:t>
+              <a:t>25/9/15</a:t>
             </a:fld>
             <a:endParaRPr lang="en-US"/>
           </a:p>
@@ -1764,7 +1765,7 @@
           <a:p>
             <a:fld id="{8EE9B700-9B3E-4941-A27C-46EF4EE4729A}" type="datetimeFigureOut">
               <a:rPr lang="en-US" smtClean="0"/>
-              <a:t>22/9/15</a:t>
+              <a:t>25/9/15</a:t>
             </a:fld>
             <a:endParaRPr lang="en-US"/>
           </a:p>
@@ -1882,7 +1883,7 @@
           <a:p>
             <a:fld id="{8EE9B700-9B3E-4941-A27C-46EF4EE4729A}" type="datetimeFigureOut">
               <a:rPr lang="en-US" smtClean="0"/>
-              <a:t>22/9/15</a:t>
+              <a:t>25/9/15</a:t>
             </a:fld>
             <a:endParaRPr lang="en-US"/>
           </a:p>
@@ -1977,7 +1978,7 @@
           <a:p>
             <a:fld id="{8EE9B700-9B3E-4941-A27C-46EF4EE4729A}" type="datetimeFigureOut">
               <a:rPr lang="en-US" smtClean="0"/>
-              <a:t>22/9/15</a:t>
+              <a:t>25/9/15</a:t>
             </a:fld>
             <a:endParaRPr lang="en-US"/>
           </a:p>
@@ -2254,7 +2255,7 @@
           <a:p>
             <a:fld id="{8EE9B700-9B3E-4941-A27C-46EF4EE4729A}" type="datetimeFigureOut">
               <a:rPr lang="en-US" smtClean="0"/>
-              <a:t>22/9/15</a:t>
+              <a:t>25/9/15</a:t>
             </a:fld>
             <a:endParaRPr lang="en-US"/>
           </a:p>
@@ -2507,7 +2508,7 @@
           <a:p>
             <a:fld id="{8EE9B700-9B3E-4941-A27C-46EF4EE4729A}" type="datetimeFigureOut">
               <a:rPr lang="en-US" smtClean="0"/>
-              <a:t>22/9/15</a:t>
+              <a:t>25/9/15</a:t>
             </a:fld>
             <a:endParaRPr lang="en-US"/>
           </a:p>
@@ -2720,7 +2721,7 @@
           <a:p>
             <a:fld id="{8EE9B700-9B3E-4941-A27C-46EF4EE4729A}" type="datetimeFigureOut">
               <a:rPr lang="en-US" smtClean="0"/>
-              <a:t>22/9/15</a:t>
+              <a:t>25/9/15</a:t>
             </a:fld>
             <a:endParaRPr lang="en-US"/>
           </a:p>
@@ -3246,6 +3247,189 @@
     <p:extLst>
       <p:ext uri="{BB962C8B-B14F-4D97-AF65-F5344CB8AC3E}">
         <p14:creationId xmlns:p14="http://schemas.microsoft.com/office/powerpoint/2010/main" val="1140455610"/>
+      </p:ext>
+    </p:extLst>
+  </p:cSld>
+  <p:clrMapOvr>
+    <a:masterClrMapping/>
+  </p:clrMapOvr>
+</p:sld>
+</file>
+
+<file path=ppt/slides/slide2.xml><?xml version="1.0" encoding="utf-8"?>
+<p:sld xmlns:a="http://schemas.openxmlformats.org/drawingml/2006/main" xmlns:r="http://schemas.openxmlformats.org/officeDocument/2006/relationships" xmlns:p="http://schemas.openxmlformats.org/presentationml/2006/main">
+  <p:cSld>
+    <p:spTree>
+      <p:nvGrpSpPr>
+        <p:cNvPr id="1" name=""/>
+        <p:cNvGrpSpPr/>
+        <p:nvPr/>
+      </p:nvGrpSpPr>
+      <p:grpSpPr>
+        <a:xfrm>
+          <a:off x="0" y="0"/>
+          <a:ext cx="0" cy="0"/>
+          <a:chOff x="0" y="0"/>
+          <a:chExt cx="0" cy="0"/>
+        </a:xfrm>
+      </p:grpSpPr>
+      <p:sp>
+        <p:nvSpPr>
+          <p:cNvPr id="2" name="Title 1"/>
+          <p:cNvSpPr>
+            <a:spLocks noGrp="1"/>
+          </p:cNvSpPr>
+          <p:nvPr>
+            <p:ph type="title"/>
+          </p:nvPr>
+        </p:nvSpPr>
+        <p:spPr/>
+        <p:txBody>
+          <a:bodyPr/>
+          <a:lstStyle/>
+          <a:p>
+            <a:r>
+              <a:rPr lang="en-US" dirty="0" smtClean="0"/>
+              <a:t>Art Nouveau II</a:t>
+            </a:r>
+            <a:endParaRPr lang="en-US" dirty="0"/>
+          </a:p>
+        </p:txBody>
+      </p:sp>
+      <p:sp>
+        <p:nvSpPr>
+          <p:cNvPr id="3" name="Text Placeholder 2"/>
+          <p:cNvSpPr>
+            <a:spLocks noGrp="1"/>
+          </p:cNvSpPr>
+          <p:nvPr>
+            <p:ph type="body" idx="1"/>
+          </p:nvPr>
+        </p:nvSpPr>
+        <p:spPr/>
+        <p:txBody>
+          <a:bodyPr>
+            <a:normAutofit fontScale="70000" lnSpcReduction="20000"/>
+          </a:bodyPr>
+          <a:lstStyle/>
+          <a:p>
+            <a:r>
+              <a:rPr lang="en-US" dirty="0" smtClean="0"/>
+              <a:t>Expressionism: </a:t>
+            </a:r>
+            <a:r>
+              <a:rPr lang="en-US" dirty="0" err="1" smtClean="0"/>
+              <a:t>Musik</a:t>
+            </a:r>
+            <a:r>
+              <a:rPr lang="en-US" dirty="0" smtClean="0"/>
+              <a:t> </a:t>
+            </a:r>
+            <a:r>
+              <a:rPr lang="en-US" dirty="0" err="1" smtClean="0"/>
+              <a:t>Festwoche</a:t>
+            </a:r>
+            <a:r>
+              <a:rPr lang="en-US" dirty="0" smtClean="0"/>
+              <a:t>. Stark contrast </a:t>
+            </a:r>
+            <a:r>
+              <a:rPr lang="en-US" smtClean="0"/>
+              <a:t>between colors. </a:t>
+            </a:r>
+            <a:r>
+              <a:rPr lang="en-US" dirty="0" smtClean="0"/>
+              <a:t>by </a:t>
+            </a:r>
+            <a:r>
+              <a:rPr lang="en-US" dirty="0" err="1" smtClean="0"/>
+              <a:t>Egon</a:t>
+            </a:r>
+            <a:r>
+              <a:rPr lang="en-US" dirty="0" smtClean="0"/>
+              <a:t> </a:t>
+            </a:r>
+            <a:r>
+              <a:rPr lang="en-US" dirty="0" err="1" smtClean="0"/>
+              <a:t>Schiele</a:t>
+            </a:r>
+            <a:endParaRPr lang="en-US" dirty="0"/>
+          </a:p>
+        </p:txBody>
+      </p:sp>
+      <p:sp>
+        <p:nvSpPr>
+          <p:cNvPr id="5" name="Text Placeholder 4"/>
+          <p:cNvSpPr>
+            <a:spLocks noGrp="1"/>
+          </p:cNvSpPr>
+          <p:nvPr>
+            <p:ph type="body" sz="quarter" idx="3"/>
+          </p:nvPr>
+        </p:nvSpPr>
+        <p:spPr/>
+        <p:txBody>
+          <a:bodyPr>
+            <a:normAutofit fontScale="62500" lnSpcReduction="20000"/>
+          </a:bodyPr>
+          <a:lstStyle/>
+          <a:p>
+            <a:r>
+              <a:rPr lang="en-US" dirty="0" smtClean="0"/>
+              <a:t>Modern Expressionism: Usage of multiple colors, emphasis on facial expression. By Victor Wang</a:t>
+            </a:r>
+            <a:endParaRPr lang="en-US" dirty="0"/>
+          </a:p>
+        </p:txBody>
+      </p:sp>
+      <p:pic>
+        <p:nvPicPr>
+          <p:cNvPr id="10" name="Content Placeholder 9" descr="detail.jpg"/>
+          <p:cNvPicPr>
+            <a:picLocks noGrp="1" noChangeAspect="1"/>
+          </p:cNvPicPr>
+          <p:nvPr>
+            <p:ph sz="quarter" idx="4"/>
+          </p:nvPr>
+        </p:nvPicPr>
+        <p:blipFill>
+          <a:blip r:embed="rId2">
+            <a:extLst>
+              <a:ext uri="{28A0092B-C50C-407E-A947-70E740481C1C}">
+                <a14:useLocalDpi xmlns:a14="http://schemas.microsoft.com/office/drawing/2010/main" val="0"/>
+              </a:ext>
+            </a:extLst>
+          </a:blip>
+          <a:srcRect l="19083" r="19083"/>
+          <a:stretch>
+            <a:fillRect/>
+          </a:stretch>
+        </p:blipFill>
+        <p:spPr/>
+      </p:pic>
+      <p:pic>
+        <p:nvPicPr>
+          <p:cNvPr id="9" name="Content Placeholder 8"/>
+          <p:cNvPicPr>
+            <a:picLocks noGrp="1" noChangeAspect="1"/>
+          </p:cNvPicPr>
+          <p:nvPr>
+            <p:ph sz="half" idx="2"/>
+          </p:nvPr>
+        </p:nvPicPr>
+        <p:blipFill>
+          <a:blip r:embed="rId3"/>
+          <a:srcRect l="11401" r="11401"/>
+          <a:stretch>
+            <a:fillRect/>
+          </a:stretch>
+        </p:blipFill>
+        <p:spPr/>
+      </p:pic>
+    </p:spTree>
+    <p:extLst>
+      <p:ext uri="{BB962C8B-B14F-4D97-AF65-F5344CB8AC3E}">
+        <p14:creationId xmlns:p14="http://schemas.microsoft.com/office/powerpoint/2010/main" val="1209110278"/>
       </p:ext>
     </p:extLst>
   </p:cSld>

</xml_diff>

<commit_message>
Added WWI art homework
</commit_message>
<xml_diff>
--- a/ART370 History of Graphic Design/Comparisons.pptx
+++ b/ART370 History of Graphic Design/Comparisons.pptx
@@ -7,6 +7,7 @@
   <p:sldIdLst>
     <p:sldId id="258" r:id="rId2"/>
     <p:sldId id="259" r:id="rId3"/>
+    <p:sldId id="260" r:id="rId4"/>
   </p:sldIdLst>
   <p:sldSz cx="9144000" cy="6858000" type="screen4x3"/>
   <p:notesSz cx="6858000" cy="9144000"/>
@@ -289,7 +290,7 @@
           <a:p>
             <a:fld id="{8EE9B700-9B3E-4941-A27C-46EF4EE4729A}" type="datetimeFigureOut">
               <a:rPr lang="en-US" smtClean="0"/>
-              <a:t>25/9/15</a:t>
+              <a:t>1/10/15</a:t>
             </a:fld>
             <a:endParaRPr lang="en-US"/>
           </a:p>
@@ -459,7 +460,7 @@
           <a:p>
             <a:fld id="{8EE9B700-9B3E-4941-A27C-46EF4EE4729A}" type="datetimeFigureOut">
               <a:rPr lang="en-US" smtClean="0"/>
-              <a:t>25/9/15</a:t>
+              <a:t>1/10/15</a:t>
             </a:fld>
             <a:endParaRPr lang="en-US"/>
           </a:p>
@@ -639,7 +640,7 @@
           <a:p>
             <a:fld id="{8EE9B700-9B3E-4941-A27C-46EF4EE4729A}" type="datetimeFigureOut">
               <a:rPr lang="en-US" smtClean="0"/>
-              <a:t>25/9/15</a:t>
+              <a:t>1/10/15</a:t>
             </a:fld>
             <a:endParaRPr lang="en-US"/>
           </a:p>
@@ -809,7 +810,7 @@
           <a:p>
             <a:fld id="{8EE9B700-9B3E-4941-A27C-46EF4EE4729A}" type="datetimeFigureOut">
               <a:rPr lang="en-US" smtClean="0"/>
-              <a:t>25/9/15</a:t>
+              <a:t>1/10/15</a:t>
             </a:fld>
             <a:endParaRPr lang="en-US"/>
           </a:p>
@@ -1055,7 +1056,7 @@
           <a:p>
             <a:fld id="{8EE9B700-9B3E-4941-A27C-46EF4EE4729A}" type="datetimeFigureOut">
               <a:rPr lang="en-US" smtClean="0"/>
-              <a:t>25/9/15</a:t>
+              <a:t>1/10/15</a:t>
             </a:fld>
             <a:endParaRPr lang="en-US"/>
           </a:p>
@@ -1343,7 +1344,7 @@
           <a:p>
             <a:fld id="{8EE9B700-9B3E-4941-A27C-46EF4EE4729A}" type="datetimeFigureOut">
               <a:rPr lang="en-US" smtClean="0"/>
-              <a:t>25/9/15</a:t>
+              <a:t>1/10/15</a:t>
             </a:fld>
             <a:endParaRPr lang="en-US"/>
           </a:p>
@@ -1765,7 +1766,7 @@
           <a:p>
             <a:fld id="{8EE9B700-9B3E-4941-A27C-46EF4EE4729A}" type="datetimeFigureOut">
               <a:rPr lang="en-US" smtClean="0"/>
-              <a:t>25/9/15</a:t>
+              <a:t>1/10/15</a:t>
             </a:fld>
             <a:endParaRPr lang="en-US"/>
           </a:p>
@@ -1883,7 +1884,7 @@
           <a:p>
             <a:fld id="{8EE9B700-9B3E-4941-A27C-46EF4EE4729A}" type="datetimeFigureOut">
               <a:rPr lang="en-US" smtClean="0"/>
-              <a:t>25/9/15</a:t>
+              <a:t>1/10/15</a:t>
             </a:fld>
             <a:endParaRPr lang="en-US"/>
           </a:p>
@@ -1978,7 +1979,7 @@
           <a:p>
             <a:fld id="{8EE9B700-9B3E-4941-A27C-46EF4EE4729A}" type="datetimeFigureOut">
               <a:rPr lang="en-US" smtClean="0"/>
-              <a:t>25/9/15</a:t>
+              <a:t>1/10/15</a:t>
             </a:fld>
             <a:endParaRPr lang="en-US"/>
           </a:p>
@@ -2255,7 +2256,7 @@
           <a:p>
             <a:fld id="{8EE9B700-9B3E-4941-A27C-46EF4EE4729A}" type="datetimeFigureOut">
               <a:rPr lang="en-US" smtClean="0"/>
-              <a:t>25/9/15</a:t>
+              <a:t>1/10/15</a:t>
             </a:fld>
             <a:endParaRPr lang="en-US"/>
           </a:p>
@@ -2508,7 +2509,7 @@
           <a:p>
             <a:fld id="{8EE9B700-9B3E-4941-A27C-46EF4EE4729A}" type="datetimeFigureOut">
               <a:rPr lang="en-US" smtClean="0"/>
-              <a:t>25/9/15</a:t>
+              <a:t>1/10/15</a:t>
             </a:fld>
             <a:endParaRPr lang="en-US"/>
           </a:p>
@@ -2721,7 +2722,7 @@
           <a:p>
             <a:fld id="{8EE9B700-9B3E-4941-A27C-46EF4EE4729A}" type="datetimeFigureOut">
               <a:rPr lang="en-US" smtClean="0"/>
-              <a:t>25/9/15</a:t>
+              <a:t>1/10/15</a:t>
             </a:fld>
             <a:endParaRPr lang="en-US"/>
           </a:p>
@@ -3430,6 +3431,179 @@
     <p:extLst>
       <p:ext uri="{BB962C8B-B14F-4D97-AF65-F5344CB8AC3E}">
         <p14:creationId xmlns:p14="http://schemas.microsoft.com/office/powerpoint/2010/main" val="1209110278"/>
+      </p:ext>
+    </p:extLst>
+  </p:cSld>
+  <p:clrMapOvr>
+    <a:masterClrMapping/>
+  </p:clrMapOvr>
+</p:sld>
+</file>
+
+<file path=ppt/slides/slide3.xml><?xml version="1.0" encoding="utf-8"?>
+<p:sld xmlns:a="http://schemas.openxmlformats.org/drawingml/2006/main" xmlns:r="http://schemas.openxmlformats.org/officeDocument/2006/relationships" xmlns:p="http://schemas.openxmlformats.org/presentationml/2006/main">
+  <p:cSld>
+    <p:spTree>
+      <p:nvGrpSpPr>
+        <p:cNvPr id="1" name=""/>
+        <p:cNvGrpSpPr/>
+        <p:nvPr/>
+      </p:nvGrpSpPr>
+      <p:grpSpPr>
+        <a:xfrm>
+          <a:off x="0" y="0"/>
+          <a:ext cx="0" cy="0"/>
+          <a:chOff x="0" y="0"/>
+          <a:chExt cx="0" cy="0"/>
+        </a:xfrm>
+      </p:grpSpPr>
+      <p:sp>
+        <p:nvSpPr>
+          <p:cNvPr id="2" name="Title 1"/>
+          <p:cNvSpPr>
+            <a:spLocks noGrp="1"/>
+          </p:cNvSpPr>
+          <p:nvPr>
+            <p:ph type="title"/>
+          </p:nvPr>
+        </p:nvSpPr>
+        <p:spPr/>
+        <p:txBody>
+          <a:bodyPr/>
+          <a:lstStyle/>
+          <a:p>
+            <a:r>
+              <a:rPr lang="en-US" dirty="0" smtClean="0"/>
+              <a:t>Dada</a:t>
+            </a:r>
+            <a:endParaRPr lang="en-US" dirty="0"/>
+          </a:p>
+        </p:txBody>
+      </p:sp>
+      <p:sp>
+        <p:nvSpPr>
+          <p:cNvPr id="3" name="Text Placeholder 2"/>
+          <p:cNvSpPr>
+            <a:spLocks noGrp="1"/>
+          </p:cNvSpPr>
+          <p:nvPr>
+            <p:ph type="body" idx="1"/>
+          </p:nvPr>
+        </p:nvSpPr>
+        <p:spPr/>
+        <p:txBody>
+          <a:bodyPr>
+            <a:normAutofit fontScale="70000" lnSpcReduction="20000"/>
+          </a:bodyPr>
+          <a:lstStyle/>
+          <a:p>
+            <a:r>
+              <a:rPr lang="en-US" dirty="0" smtClean="0"/>
+              <a:t>Salon Dada: Tristan </a:t>
+            </a:r>
+            <a:r>
+              <a:rPr lang="en-US" dirty="0" err="1" smtClean="0"/>
+              <a:t>Tzara</a:t>
+            </a:r>
+            <a:r>
+              <a:rPr lang="en-US" dirty="0" smtClean="0"/>
+              <a:t> – Disorganized, </a:t>
+            </a:r>
+            <a:r>
+              <a:rPr lang="en-US" dirty="0" err="1" smtClean="0"/>
+              <a:t>unorderly</a:t>
+            </a:r>
+            <a:r>
+              <a:rPr lang="en-US" dirty="0" smtClean="0"/>
+              <a:t>, and almost unrelated concepts</a:t>
+            </a:r>
+            <a:endParaRPr lang="en-US" dirty="0"/>
+          </a:p>
+        </p:txBody>
+      </p:sp>
+      <p:pic>
+        <p:nvPicPr>
+          <p:cNvPr id="8" name="Content Placeholder 7"/>
+          <p:cNvPicPr>
+            <a:picLocks noGrp="1" noChangeAspect="1"/>
+          </p:cNvPicPr>
+          <p:nvPr>
+            <p:ph sz="half" idx="2"/>
+          </p:nvPr>
+        </p:nvPicPr>
+        <p:blipFill>
+          <a:blip r:embed="rId2"/>
+          <a:srcRect t="16933" b="16933"/>
+          <a:stretch>
+            <a:fillRect/>
+          </a:stretch>
+        </p:blipFill>
+        <p:spPr/>
+      </p:pic>
+      <p:sp>
+        <p:nvSpPr>
+          <p:cNvPr id="5" name="Text Placeholder 4"/>
+          <p:cNvSpPr>
+            <a:spLocks noGrp="1"/>
+          </p:cNvSpPr>
+          <p:nvPr>
+            <p:ph type="body" sz="quarter" idx="3"/>
+          </p:nvPr>
+        </p:nvSpPr>
+        <p:spPr/>
+        <p:txBody>
+          <a:bodyPr>
+            <a:normAutofit fontScale="70000" lnSpcReduction="20000"/>
+          </a:bodyPr>
+          <a:lstStyle/>
+          <a:p>
+            <a:r>
+              <a:rPr lang="en-US" dirty="0" smtClean="0"/>
+              <a:t>Image by Pablo </a:t>
+            </a:r>
+            <a:r>
+              <a:rPr lang="en-US" dirty="0" err="1" smtClean="0"/>
+              <a:t>Macalup</a:t>
+            </a:r>
+            <a:r>
+              <a:rPr lang="en-US" dirty="0" err="1" smtClean="0"/>
+              <a:t>ú</a:t>
+            </a:r>
+            <a:r>
+              <a:rPr lang="en-US" dirty="0" smtClean="0"/>
+              <a:t>: Similarly messy. Compilation of different </a:t>
+            </a:r>
+            <a:r>
+              <a:rPr lang="en-US" smtClean="0"/>
+              <a:t>Spanish words.</a:t>
+            </a:r>
+            <a:endParaRPr lang="en-US" dirty="0"/>
+          </a:p>
+        </p:txBody>
+      </p:sp>
+      <p:pic>
+        <p:nvPicPr>
+          <p:cNvPr id="7" name="Content Placeholder 6"/>
+          <p:cNvPicPr>
+            <a:picLocks noGrp="1" noChangeAspect="1"/>
+          </p:cNvPicPr>
+          <p:nvPr>
+            <p:ph sz="quarter" idx="4"/>
+          </p:nvPr>
+        </p:nvPicPr>
+        <p:blipFill>
+          <a:blip r:embed="rId3"/>
+          <a:srcRect l="11685" r="11685"/>
+          <a:stretch>
+            <a:fillRect/>
+          </a:stretch>
+        </p:blipFill>
+        <p:spPr/>
+      </p:pic>
+    </p:spTree>
+    <p:extLst>
+      <p:ext uri="{BB962C8B-B14F-4D97-AF65-F5344CB8AC3E}">
+        <p14:creationId xmlns:p14="http://schemas.microsoft.com/office/powerpoint/2010/main" val="4074440144"/>
       </p:ext>
     </p:extLst>
   </p:cSld>

</xml_diff>